<commit_message>
update test case metrics
</commit_message>
<xml_diff>
--- a/Learn-Typescript/Test-Case-Mterics-PPT.pptx
+++ b/Learn-Typescript/Test-Case-Mterics-PPT.pptx
@@ -4077,12 +4077,81 @@
           </a:p>
         </p:txBody>
       </p:sp>
+      <p:sp>
+        <p:nvSpPr>
+          <p:cNvPr id="4" name="Title 1">
+            <a:extLst>
+              <a:ext uri="{FF2B5EF4-FFF2-40B4-BE49-F238E27FC236}">
+                <a16:creationId xmlns:a16="http://schemas.microsoft.com/office/drawing/2014/main" id="{BD3EB35B-E315-5CC2-5040-582B4E54F44D}"/>
+              </a:ext>
+            </a:extLst>
+          </p:cNvPr>
+          <p:cNvSpPr txBox="1">
+            <a:spLocks/>
+          </p:cNvSpPr>
+          <p:nvPr/>
+        </p:nvSpPr>
+        <p:spPr>
+          <a:xfrm>
+            <a:off x="838200" y="365125"/>
+            <a:ext cx="10515600" cy="1325563"/>
+          </a:xfrm>
+          <a:prstGeom prst="rect">
+            <a:avLst/>
+          </a:prstGeom>
+        </p:spPr>
+        <p:txBody>
+          <a:bodyPr vert="horz" lIns="91440" tIns="45720" rIns="91440" bIns="45720" rtlCol="0" anchor="b">
+            <a:normAutofit fontScale="75000" lnSpcReduction="20000"/>
+          </a:bodyPr>
+          <a:lstStyle>
+            <a:lvl1pPr algn="ctr" defTabSz="914400" rtl="0" eaLnBrk="1" latinLnBrk="0" hangingPunct="1">
+              <a:lnSpc>
+                <a:spcPct val="90000"/>
+              </a:lnSpc>
+              <a:spcBef>
+                <a:spcPct val="0"/>
+              </a:spcBef>
+              <a:buNone/>
+              <a:defRPr sz="6000" kern="1200">
+                <a:solidFill>
+                  <a:schemeClr val="tx1"/>
+                </a:solidFill>
+                <a:latin typeface="+mj-lt"/>
+                <a:ea typeface="+mj-ea"/>
+                <a:cs typeface="+mj-cs"/>
+              </a:defRPr>
+            </a:lvl1pPr>
+          </a:lstStyle>
+          <a:p>
+            <a:r>
+              <a:rPr lang="en-US" dirty="0"/>
+              <a:t>Daily Test Case Details</a:t>
+            </a:r>
+            <a:br>
+              <a:rPr lang="en-US" dirty="0"/>
+            </a:br>
+            <a:endParaRPr lang="en-US" dirty="0"/>
+          </a:p>
+          <a:p>
+            <a:r>
+              <a:rPr lang="en-US" sz="2000" b="1" dirty="0">
+                <a:latin typeface="Oxygen" panose="02000503000000000000" pitchFamily="2" charset="0"/>
+              </a:rPr>
+              <a:t>Date : 07-03-2025</a:t>
+            </a:r>
+            <a:endParaRPr lang="en-IN" sz="2000" b="1" dirty="0">
+              <a:latin typeface="Oxygen" panose="02000503000000000000" pitchFamily="2" charset="0"/>
+            </a:endParaRPr>
+          </a:p>
+        </p:txBody>
+      </p:sp>
       <p:pic>
         <p:nvPicPr>
-          <p:cNvPr id="5" name="Picture 4">
-            <a:extLst>
-              <a:ext uri="{FF2B5EF4-FFF2-40B4-BE49-F238E27FC236}">
-                <a16:creationId xmlns:a16="http://schemas.microsoft.com/office/drawing/2014/main" id="{6963C7BD-E32A-07E3-6399-100427BF305A}"/>
+          <p:cNvPr id="7" name="Picture 6">
+            <a:extLst>
+              <a:ext uri="{FF2B5EF4-FFF2-40B4-BE49-F238E27FC236}">
+                <a16:creationId xmlns:a16="http://schemas.microsoft.com/office/drawing/2014/main" id="{562B2DC7-C395-FB76-BA7D-EDBBAA0B0F05}"/>
               </a:ext>
             </a:extLst>
           </p:cNvPr>
@@ -4099,83 +4168,14 @@
         </p:blipFill>
         <p:spPr>
           <a:xfrm>
-            <a:off x="153976" y="2235199"/>
-            <a:ext cx="11884048" cy="2387601"/>
+            <a:off x="670755" y="2009322"/>
+            <a:ext cx="10850489" cy="3248478"/>
           </a:xfrm>
           <a:prstGeom prst="rect">
             <a:avLst/>
           </a:prstGeom>
         </p:spPr>
       </p:pic>
-      <p:sp>
-        <p:nvSpPr>
-          <p:cNvPr id="4" name="Title 1">
-            <a:extLst>
-              <a:ext uri="{FF2B5EF4-FFF2-40B4-BE49-F238E27FC236}">
-                <a16:creationId xmlns:a16="http://schemas.microsoft.com/office/drawing/2014/main" id="{BD3EB35B-E315-5CC2-5040-582B4E54F44D}"/>
-              </a:ext>
-            </a:extLst>
-          </p:cNvPr>
-          <p:cNvSpPr txBox="1">
-            <a:spLocks/>
-          </p:cNvSpPr>
-          <p:nvPr/>
-        </p:nvSpPr>
-        <p:spPr>
-          <a:xfrm>
-            <a:off x="838200" y="365125"/>
-            <a:ext cx="10515600" cy="1325563"/>
-          </a:xfrm>
-          <a:prstGeom prst="rect">
-            <a:avLst/>
-          </a:prstGeom>
-        </p:spPr>
-        <p:txBody>
-          <a:bodyPr vert="horz" lIns="91440" tIns="45720" rIns="91440" bIns="45720" rtlCol="0" anchor="b">
-            <a:normAutofit fontScale="75000" lnSpcReduction="20000"/>
-          </a:bodyPr>
-          <a:lstStyle>
-            <a:lvl1pPr algn="ctr" defTabSz="914400" rtl="0" eaLnBrk="1" latinLnBrk="0" hangingPunct="1">
-              <a:lnSpc>
-                <a:spcPct val="90000"/>
-              </a:lnSpc>
-              <a:spcBef>
-                <a:spcPct val="0"/>
-              </a:spcBef>
-              <a:buNone/>
-              <a:defRPr sz="6000" kern="1200">
-                <a:solidFill>
-                  <a:schemeClr val="tx1"/>
-                </a:solidFill>
-                <a:latin typeface="+mj-lt"/>
-                <a:ea typeface="+mj-ea"/>
-                <a:cs typeface="+mj-cs"/>
-              </a:defRPr>
-            </a:lvl1pPr>
-          </a:lstStyle>
-          <a:p>
-            <a:r>
-              <a:rPr lang="en-US" dirty="0"/>
-              <a:t>Daily Test Case Details</a:t>
-            </a:r>
-            <a:br>
-              <a:rPr lang="en-US" dirty="0"/>
-            </a:br>
-            <a:endParaRPr lang="en-US" dirty="0"/>
-          </a:p>
-          <a:p>
-            <a:r>
-              <a:rPr lang="en-US" sz="2000" b="1" dirty="0">
-                <a:latin typeface="Oxygen" panose="02000503000000000000" pitchFamily="2" charset="0"/>
-              </a:rPr>
-              <a:t>Date : 07-03-2025</a:t>
-            </a:r>
-            <a:endParaRPr lang="en-IN" sz="2000" b="1" dirty="0">
-              <a:latin typeface="Oxygen" panose="02000503000000000000" pitchFamily="2" charset="0"/>
-            </a:endParaRPr>
-          </a:p>
-        </p:txBody>
-      </p:sp>
     </p:spTree>
     <p:extLst>
       <p:ext uri="{BB962C8B-B14F-4D97-AF65-F5344CB8AC3E}">

</xml_diff>